<commit_message>
add requirements and fonts
</commit_message>
<xml_diff>
--- a/OCR_Torch.pptx
+++ b/OCR_Torch.pptx
@@ -128,7 +128,7 @@
 <file path=ppt/revisionInfo.xml><?xml version="1.0" encoding="utf-8"?>
 <p1510:revInfo xmlns:a="http://schemas.openxmlformats.org/drawingml/2006/main" xmlns:r="http://schemas.openxmlformats.org/officeDocument/2006/relationships" xmlns:p1510="http://schemas.microsoft.com/office/powerpoint/2015/10/main">
   <p1510:revLst>
-    <p1510:client id="{7D912828-0D81-4F3B-B191-B6BA93658D2F}" v="2" dt="2024-05-10T01:31:56.679"/>
+    <p1510:client id="{7D912828-0D81-4F3B-B191-B6BA93658D2F}" v="6" dt="2024-05-10T15:44:55.505"/>
   </p1510:revLst>
 </p1510:revInfo>
 </file>
@@ -138,10 +138,41 @@
   <pc:docChgLst>
     <pc:chgData name="Tsai, Ping-Chen" userId="9132b96a-ba54-4186-bc65-f286b02f1bb4" providerId="ADAL" clId="{7D912828-0D81-4F3B-B191-B6BA93658D2F}"/>
     <pc:docChg chg="custSel addSld modSld">
-      <pc:chgData name="Tsai, Ping-Chen" userId="9132b96a-ba54-4186-bc65-f286b02f1bb4" providerId="ADAL" clId="{7D912828-0D81-4F3B-B191-B6BA93658D2F}" dt="2024-05-10T01:32:18.401" v="249" actId="20577"/>
+      <pc:chgData name="Tsai, Ping-Chen" userId="9132b96a-ba54-4186-bc65-f286b02f1bb4" providerId="ADAL" clId="{7D912828-0D81-4F3B-B191-B6BA93658D2F}" dt="2024-05-10T15:44:55.505" v="274"/>
       <pc:docMkLst>
         <pc:docMk/>
       </pc:docMkLst>
+      <pc:sldChg chg="addSp modSp mod setBg">
+        <pc:chgData name="Tsai, Ping-Chen" userId="9132b96a-ba54-4186-bc65-f286b02f1bb4" providerId="ADAL" clId="{7D912828-0D81-4F3B-B191-B6BA93658D2F}" dt="2024-05-10T15:44:55.505" v="274"/>
+        <pc:sldMkLst>
+          <pc:docMk/>
+          <pc:sldMk cId="3415721293" sldId="257"/>
+        </pc:sldMkLst>
+        <pc:spChg chg="mod">
+          <ac:chgData name="Tsai, Ping-Chen" userId="9132b96a-ba54-4186-bc65-f286b02f1bb4" providerId="ADAL" clId="{7D912828-0D81-4F3B-B191-B6BA93658D2F}" dt="2024-05-10T15:44:55.505" v="274"/>
+          <ac:spMkLst>
+            <pc:docMk/>
+            <pc:sldMk cId="3415721293" sldId="257"/>
+            <ac:spMk id="3" creationId="{019A846C-E604-3092-BC3E-4E75A5BF784E}"/>
+          </ac:spMkLst>
+        </pc:spChg>
+        <pc:spChg chg="add">
+          <ac:chgData name="Tsai, Ping-Chen" userId="9132b96a-ba54-4186-bc65-f286b02f1bb4" providerId="ADAL" clId="{7D912828-0D81-4F3B-B191-B6BA93658D2F}" dt="2024-05-10T15:39:27.891" v="254"/>
+          <ac:spMkLst>
+            <pc:docMk/>
+            <pc:sldMk cId="3415721293" sldId="257"/>
+            <ac:spMk id="5" creationId="{8C0BCE2A-5B4D-D066-B17C-3FA66E88981F}"/>
+          </ac:spMkLst>
+        </pc:spChg>
+        <pc:graphicFrameChg chg="mod">
+          <ac:chgData name="Tsai, Ping-Chen" userId="9132b96a-ba54-4186-bc65-f286b02f1bb4" providerId="ADAL" clId="{7D912828-0D81-4F3B-B191-B6BA93658D2F}" dt="2024-05-10T15:41:56.709" v="260" actId="1076"/>
+          <ac:graphicFrameMkLst>
+            <pc:docMk/>
+            <pc:sldMk cId="3415721293" sldId="257"/>
+            <ac:graphicFrameMk id="4" creationId="{C18D6644-9C55-B684-B6D7-308711C959BF}"/>
+          </ac:graphicFrameMkLst>
+        </pc:graphicFrameChg>
+      </pc:sldChg>
       <pc:sldChg chg="modSp mod">
         <pc:chgData name="Tsai, Ping-Chen" userId="9132b96a-ba54-4186-bc65-f286b02f1bb4" providerId="ADAL" clId="{7D912828-0D81-4F3B-B191-B6BA93658D2F}" dt="2024-05-10T00:56:13.580" v="209" actId="5793"/>
         <pc:sldMkLst>
@@ -5440,7 +5471,7 @@
           </a:p>
           <a:p>
             <a:r>
-              <a:rPr lang="en-GB" altLang="zh-CN" dirty="0">
+              <a:rPr lang="en-GB" altLang="zh-CN" sz="1800" dirty="0">
                 <a:highlight>
                   <a:srgbClr val="FFFF00"/>
                 </a:highlight>
@@ -5448,7 +5479,7 @@
               <a:t>pip install </a:t>
             </a:r>
             <a:r>
-              <a:rPr lang="en-GB" altLang="zh-CN" dirty="0" err="1">
+              <a:rPr lang="en-GB" altLang="zh-CN" sz="1800" dirty="0" err="1">
                 <a:highlight>
                   <a:srgbClr val="FFFF00"/>
                 </a:highlight>
@@ -5456,13 +5487,146 @@
               <a:t>paddlepaddle</a:t>
             </a:r>
             <a:r>
-              <a:rPr lang="en-GB" altLang="zh-CN" dirty="0">
+              <a:rPr lang="en-GB" altLang="zh-CN" sz="1800" dirty="0">
                 <a:highlight>
                   <a:srgbClr val="FFFF00"/>
                 </a:highlight>
               </a:rPr>
-              <a:t> 2.1.0</a:t>
-            </a:r>
+              <a:t>==2.1.0</a:t>
+            </a:r>
+          </a:p>
+          <a:p>
+            <a:r>
+              <a:rPr lang="en-GB" altLang="zh-CN" sz="1800" dirty="0" err="1">
+                <a:highlight>
+                  <a:srgbClr val="FFFF00"/>
+                </a:highlight>
+              </a:rPr>
+              <a:t>conda</a:t>
+            </a:r>
+            <a:r>
+              <a:rPr lang="en-GB" altLang="zh-CN" sz="1800" dirty="0">
+                <a:highlight>
+                  <a:srgbClr val="FFFF00"/>
+                </a:highlight>
+              </a:rPr>
+              <a:t> install -c </a:t>
+            </a:r>
+            <a:r>
+              <a:rPr lang="en-GB" altLang="zh-CN" sz="1800" dirty="0" err="1">
+                <a:highlight>
+                  <a:srgbClr val="FFFF00"/>
+                </a:highlight>
+              </a:rPr>
+              <a:t>menpo</a:t>
+            </a:r>
+            <a:r>
+              <a:rPr lang="en-GB" altLang="zh-CN" sz="1800" dirty="0">
+                <a:highlight>
+                  <a:srgbClr val="FFFF00"/>
+                </a:highlight>
+              </a:rPr>
+              <a:t> </a:t>
+            </a:r>
+            <a:r>
+              <a:rPr lang="en-GB" altLang="zh-CN" sz="1800" dirty="0" err="1">
+                <a:highlight>
+                  <a:srgbClr val="FFFF00"/>
+                </a:highlight>
+              </a:rPr>
+              <a:t>opencv</a:t>
+            </a:r>
+            <a:endParaRPr lang="en-GB" altLang="zh-CN" sz="1800" dirty="0">
+              <a:highlight>
+                <a:srgbClr val="FFFF00"/>
+              </a:highlight>
+            </a:endParaRPr>
+          </a:p>
+          <a:p>
+            <a:r>
+              <a:rPr lang="en-GB" altLang="zh-CN" sz="1800" dirty="0" err="1">
+                <a:highlight>
+                  <a:srgbClr val="FFFF00"/>
+                </a:highlight>
+              </a:rPr>
+              <a:t>conda</a:t>
+            </a:r>
+            <a:r>
+              <a:rPr lang="en-GB" altLang="zh-CN" sz="1800" dirty="0">
+                <a:highlight>
+                  <a:srgbClr val="FFFF00"/>
+                </a:highlight>
+              </a:rPr>
+              <a:t> install -c </a:t>
+            </a:r>
+            <a:r>
+              <a:rPr lang="en-GB" altLang="zh-CN" sz="1800" dirty="0" err="1">
+                <a:highlight>
+                  <a:srgbClr val="FFFF00"/>
+                </a:highlight>
+              </a:rPr>
+              <a:t>pytorch</a:t>
+            </a:r>
+            <a:r>
+              <a:rPr lang="en-GB" altLang="zh-CN" sz="1800" dirty="0">
+                <a:highlight>
+                  <a:srgbClr val="FFFF00"/>
+                </a:highlight>
+              </a:rPr>
+              <a:t> </a:t>
+            </a:r>
+            <a:r>
+              <a:rPr lang="en-GB" altLang="zh-CN" sz="1800" dirty="0" err="1">
+                <a:highlight>
+                  <a:srgbClr val="FFFF00"/>
+                </a:highlight>
+              </a:rPr>
+              <a:t>pytorch</a:t>
+            </a:r>
+            <a:r>
+              <a:rPr lang="en-GB" altLang="zh-CN" sz="1800" dirty="0">
+                <a:highlight>
+                  <a:srgbClr val="FFFF00"/>
+                </a:highlight>
+              </a:rPr>
+              <a:t> </a:t>
+            </a:r>
+            <a:r>
+              <a:rPr lang="en-GB" altLang="zh-CN" sz="1800" dirty="0" err="1">
+                <a:highlight>
+                  <a:srgbClr val="FFFF00"/>
+                </a:highlight>
+              </a:rPr>
+              <a:t>torchvision</a:t>
+            </a:r>
+            <a:endParaRPr lang="en-GB" altLang="zh-CN" sz="1800" dirty="0">
+              <a:highlight>
+                <a:srgbClr val="FFFF00"/>
+              </a:highlight>
+            </a:endParaRPr>
+          </a:p>
+          <a:p>
+            <a:r>
+              <a:rPr lang="en-GB" altLang="zh-CN" sz="1800" dirty="0">
+                <a:highlight>
+                  <a:srgbClr val="FFFF00"/>
+                </a:highlight>
+              </a:rPr>
+              <a:t>pip install </a:t>
+            </a:r>
+            <a:r>
+              <a:rPr lang="en-GB" altLang="zh-CN" sz="1800">
+                <a:highlight>
+                  <a:srgbClr val="FFFF00"/>
+                </a:highlight>
+              </a:rPr>
+              <a:t>pyyaml</a:t>
+            </a:r>
+            <a:endParaRPr lang="en-GB" altLang="zh-CN" sz="1800" dirty="0">
+              <a:highlight>
+                <a:srgbClr val="FFFF00"/>
+              </a:highlight>
+            </a:endParaRPr>
           </a:p>
           <a:p>
             <a:endParaRPr lang="en-GB" dirty="0"/>
@@ -5484,13 +5648,13 @@
           <p:nvPr>
             <p:extLst>
               <p:ext uri="{D42A27DB-BD31-4B8C-83A1-F6EECF244321}">
-                <p14:modId xmlns:p14="http://schemas.microsoft.com/office/powerpoint/2010/main" val="2954877914"/>
+                <p14:modId xmlns:p14="http://schemas.microsoft.com/office/powerpoint/2010/main" val="4210536317"/>
               </p:ext>
             </p:extLst>
           </p:nvPr>
         </p:nvGraphicFramePr>
         <p:xfrm>
-          <a:off x="1495691" y="4594749"/>
+          <a:off x="1660583" y="5269307"/>
           <a:ext cx="8127999" cy="1483360"/>
         </p:xfrm>
         <a:graphic>

</xml_diff>